<commit_message>
Fixed small presentation error.
</commit_message>
<xml_diff>
--- a/Android Mobile Testing Presentation.pptx
+++ b/Android Mobile Testing Presentation.pptx
@@ -1211,19 +1211,7 @@
                 <a:ea typeface="+mn-ea"/>
                 <a:cs typeface="+mn-cs"/>
               </a:rPr>
-              <a:t> is Asynchronous, others run on UI thread and can update </a:t>
-            </a:r>
-            <a:r>
-              <a:rPr lang="en-US" sz="1200" kern="1200" dirty="0" smtClean="0">
-                <a:solidFill>
-                  <a:schemeClr val="tx1"/>
-                </a:solidFill>
-                <a:effectLst/>
-                <a:latin typeface="+mn-lt"/>
-                <a:ea typeface="+mn-ea"/>
-                <a:cs typeface="+mn-cs"/>
-              </a:rPr>
-              <a:t>the UI</a:t>
+              <a:t> is Asynchronous, others run on UI thread and can update the UI</a:t>
             </a:r>
             <a:endParaRPr lang="en-US" dirty="0" smtClean="0">
               <a:effectLst/>
@@ -9538,8 +9526,8 @@
   <p:clrMapOvr>
     <a:masterClrMapping/>
   </p:clrMapOvr>
-  <mc:AlternateContent xmlns:mc="http://schemas.openxmlformats.org/markup-compatibility/2006">
-    <mc:Choice xmlns:p14="http://schemas.microsoft.com/office/powerpoint/2010/main" Requires="p14">
+  <mc:AlternateContent xmlns:mc="http://schemas.openxmlformats.org/markup-compatibility/2006" xmlns:p14="http://schemas.microsoft.com/office/powerpoint/2010/main">
+    <mc:Choice Requires="p14">
       <p:transition spd="slow" p14:dur="3900">
         <p14:glitter pattern="hexagon"/>
         <p:sndAc>
@@ -9549,12 +9537,12 @@
         </p:sndAc>
       </p:transition>
     </mc:Choice>
-    <mc:Fallback>
+    <mc:Fallback xmlns="">
       <p:transition spd="slow">
         <p:fade/>
         <p:sndAc>
           <p:stSnd>
-            <p:snd r:embed="rId3" name="laser.wav"/>
+            <p:snd r:embed="rId4" name="laser.wav"/>
           </p:stSnd>
         </p:sndAc>
       </p:transition>
@@ -9633,39 +9621,21 @@
               <a:rPr lang="en-US" dirty="0" smtClean="0">
                 <a:latin typeface="Ubuntu" pitchFamily="34" charset="0"/>
               </a:rPr>
-              <a:t>Dependent on </a:t>
-            </a:r>
+              <a:t>Dependent on Mocking</a:t>
+            </a:r>
+          </a:p>
+          <a:p>
+            <a:endParaRPr lang="en-US" dirty="0">
+              <a:latin typeface="Ubuntu" pitchFamily="34" charset="0"/>
+            </a:endParaRPr>
+          </a:p>
+          <a:p>
             <a:r>
               <a:rPr lang="en-US" dirty="0" smtClean="0">
                 <a:latin typeface="Ubuntu" pitchFamily="34" charset="0"/>
               </a:rPr>
-              <a:t>Mocking</a:t>
-            </a:r>
-            <a:endParaRPr lang="en-US" dirty="0" smtClean="0">
-              <a:latin typeface="Ubuntu" pitchFamily="34" charset="0"/>
-            </a:endParaRPr>
-          </a:p>
-          <a:p>
-            <a:endParaRPr lang="en-US" dirty="0">
-              <a:latin typeface="Ubuntu" pitchFamily="34" charset="0"/>
-            </a:endParaRPr>
-          </a:p>
-          <a:p>
-            <a:r>
-              <a:rPr lang="en-US" dirty="0" smtClean="0">
-                <a:latin typeface="Ubuntu" pitchFamily="34" charset="0"/>
-              </a:rPr>
-              <a:t>Many system </a:t>
-            </a:r>
-            <a:r>
-              <a:rPr lang="en-US" dirty="0" smtClean="0">
-                <a:latin typeface="Ubuntu" pitchFamily="34" charset="0"/>
-              </a:rPr>
-              <a:t>objects required</a:t>
-            </a:r>
-            <a:endParaRPr lang="en-US" dirty="0" smtClean="0">
-              <a:latin typeface="Ubuntu" pitchFamily="34" charset="0"/>
-            </a:endParaRPr>
+              <a:t>Many system objects required</a:t>
+            </a:r>
           </a:p>
           <a:p>
             <a:endParaRPr lang="en-US" dirty="0">
@@ -9695,13 +9665,13 @@
   <p:clrMapOvr>
     <a:masterClrMapping/>
   </p:clrMapOvr>
-  <mc:AlternateContent xmlns:mc="http://schemas.openxmlformats.org/markup-compatibility/2006">
-    <mc:Choice xmlns:p14="http://schemas.microsoft.com/office/powerpoint/2010/main" Requires="p14">
+  <mc:AlternateContent xmlns:mc="http://schemas.openxmlformats.org/markup-compatibility/2006" xmlns:p14="http://schemas.microsoft.com/office/powerpoint/2010/main">
+    <mc:Choice Requires="p14">
       <p:transition spd="slow" p14:dur="1200">
         <p14:prism/>
       </p:transition>
     </mc:Choice>
-    <mc:Fallback>
+    <mc:Fallback xmlns="">
       <p:transition spd="slow">
         <p:fade/>
       </p:transition>
@@ -9820,13 +9790,13 @@
   <p:clrMapOvr>
     <a:masterClrMapping/>
   </p:clrMapOvr>
-  <mc:AlternateContent xmlns:mc="http://schemas.openxmlformats.org/markup-compatibility/2006">
-    <mc:Choice xmlns:p14="http://schemas.microsoft.com/office/powerpoint/2010/main" Requires="p14">
+  <mc:AlternateContent xmlns:mc="http://schemas.openxmlformats.org/markup-compatibility/2006" xmlns:p14="http://schemas.microsoft.com/office/powerpoint/2010/main">
+    <mc:Choice Requires="p14">
       <p:transition spd="slow">
         <p14:flash/>
       </p:transition>
     </mc:Choice>
-    <mc:Fallback>
+    <mc:Fallback xmlns="">
       <p:transition spd="slow">
         <p:fade/>
       </p:transition>
@@ -9917,7 +9887,15 @@
           <a:p>
             <a:r>
               <a:rPr lang="en-US" dirty="0" smtClean="0"/>
-              <a:t>Testing requires specifying a Runnable object to execute tests within to get around application permissions</a:t>
+              <a:t>Testing requires specifying a Runnable object to execute tests </a:t>
+            </a:r>
+            <a:r>
+              <a:rPr lang="en-US" smtClean="0"/>
+              <a:t>within Android </a:t>
+            </a:r>
+            <a:r>
+              <a:rPr lang="en-US" dirty="0" smtClean="0"/>
+              <a:t>to get around application permissions</a:t>
             </a:r>
             <a:endParaRPr lang="en-US" dirty="0"/>
           </a:p>
@@ -9933,13 +9911,13 @@
   <p:clrMapOvr>
     <a:masterClrMapping/>
   </p:clrMapOvr>
-  <mc:AlternateContent xmlns:mc="http://schemas.openxmlformats.org/markup-compatibility/2006">
-    <mc:Choice xmlns:p14="http://schemas.microsoft.com/office/powerpoint/2010/main" Requires="p14">
+  <mc:AlternateContent xmlns:mc="http://schemas.openxmlformats.org/markup-compatibility/2006" xmlns:p14="http://schemas.microsoft.com/office/powerpoint/2010/main">
+    <mc:Choice Requires="p14">
       <p:transition spd="slow" p14:dur="1400">
         <p14:doors dir="vert"/>
       </p:transition>
     </mc:Choice>
-    <mc:Fallback>
+    <mc:Fallback xmlns="">
       <p:transition spd="slow">
         <p:fade/>
       </p:transition>
@@ -10164,13 +10142,13 @@
   <p:clrMapOvr>
     <a:masterClrMapping/>
   </p:clrMapOvr>
-  <mc:AlternateContent xmlns:mc="http://schemas.openxmlformats.org/markup-compatibility/2006">
-    <mc:Choice xmlns:p14="http://schemas.microsoft.com/office/powerpoint/2010/main" Requires="p14">
+  <mc:AlternateContent xmlns:mc="http://schemas.openxmlformats.org/markup-compatibility/2006" xmlns:p14="http://schemas.microsoft.com/office/powerpoint/2010/main">
+    <mc:Choice Requires="p14">
       <p:transition spd="slow" p14:dur="1600">
         <p14:prism isContent="1" isInverted="1"/>
       </p:transition>
     </mc:Choice>
-    <mc:Fallback>
+    <mc:Fallback xmlns="">
       <p:transition spd="slow">
         <p:fade/>
       </p:transition>
@@ -10285,15 +10263,7 @@
               <a:srgbClr val="C0C0C0"/>
             </a:contourClr>
           </a:sp3d>
-          <a:extLst>
-            <a:ext uri="{909E8E84-426E-40DD-AFC4-6F175D3DCCD1}">
-              <a14:hiddenFill xmlns:a14="http://schemas.microsoft.com/office/drawing/2010/main">
-                <a:solidFill>
-                  <a:srgbClr val="FFFFFF"/>
-                </a:solidFill>
-              </a14:hiddenFill>
-            </a:ext>
-          </a:extLst>
+          <a:extLst/>
         </p:spPr>
       </p:pic>
     </p:spTree>
@@ -10306,13 +10276,13 @@
   <p:clrMapOvr>
     <a:masterClrMapping/>
   </p:clrMapOvr>
-  <mc:AlternateContent xmlns:mc="http://schemas.openxmlformats.org/markup-compatibility/2006">
-    <mc:Choice xmlns:p14="http://schemas.microsoft.com/office/powerpoint/2010/main" Requires="p14">
+  <mc:AlternateContent xmlns:mc="http://schemas.openxmlformats.org/markup-compatibility/2006" xmlns:p14="http://schemas.microsoft.com/office/powerpoint/2010/main">
+    <mc:Choice Requires="p14">
       <p:transition spd="slow" p14:dur="4000">
         <p14:vortex dir="r"/>
       </p:transition>
     </mc:Choice>
-    <mc:Fallback>
+    <mc:Fallback xmlns="">
       <p:transition spd="slow">
         <p:fade/>
       </p:transition>
@@ -10432,15 +10402,7 @@
               <a:srgbClr val="C0C0C0"/>
             </a:contourClr>
           </a:sp3d>
-          <a:extLst>
-            <a:ext uri="{909E8E84-426E-40DD-AFC4-6F175D3DCCD1}">
-              <a14:hiddenFill xmlns:a14="http://schemas.microsoft.com/office/drawing/2010/main">
-                <a:solidFill>
-                  <a:srgbClr val="FFFFFF"/>
-                </a:solidFill>
-              </a14:hiddenFill>
-            </a:ext>
-          </a:extLst>
+          <a:extLst/>
         </p:spPr>
       </p:pic>
     </p:spTree>
@@ -10453,8 +10415,8 @@
   <p:clrMapOvr>
     <a:masterClrMapping/>
   </p:clrMapOvr>
-  <mc:AlternateContent xmlns:mc="http://schemas.openxmlformats.org/markup-compatibility/2006">
-    <mc:Choice xmlns:p14="http://schemas.microsoft.com/office/powerpoint/2010/main" Requires="p14">
+  <mc:AlternateContent xmlns:mc="http://schemas.openxmlformats.org/markup-compatibility/2006" xmlns:p14="http://schemas.microsoft.com/office/powerpoint/2010/main">
+    <mc:Choice Requires="p14">
       <p:transition spd="slow" p14:dur="1500">
         <p:split orient="vert"/>
         <p:sndAc>
@@ -10464,12 +10426,12 @@
         </p:sndAc>
       </p:transition>
     </mc:Choice>
-    <mc:Fallback>
+    <mc:Fallback xmlns="">
       <p:transition spd="slow">
         <p:split orient="vert"/>
         <p:sndAc>
           <p:stSnd>
-            <p:snd r:embed="rId2" name="chimes.wav"/>
+            <p:snd r:embed="rId4" name="chimes.wav"/>
           </p:stSnd>
         </p:sndAc>
       </p:transition>
@@ -10580,8 +10542,8 @@
   <p:clrMapOvr>
     <a:masterClrMapping/>
   </p:clrMapOvr>
-  <mc:AlternateContent xmlns:mc="http://schemas.openxmlformats.org/markup-compatibility/2006">
-    <mc:Choice xmlns:p14="http://schemas.microsoft.com/office/powerpoint/2010/main" Requires="p14">
+  <mc:AlternateContent xmlns:mc="http://schemas.openxmlformats.org/markup-compatibility/2006" xmlns:p14="http://schemas.microsoft.com/office/powerpoint/2010/main">
+    <mc:Choice Requires="p14">
       <p:transition spd="slow" p14:dur="4400">
         <p14:honeycomb/>
         <p:sndAc>
@@ -10591,12 +10553,12 @@
         </p:sndAc>
       </p:transition>
     </mc:Choice>
-    <mc:Fallback>
+    <mc:Fallback xmlns="">
       <p:transition spd="slow">
         <p:fade/>
         <p:sndAc>
           <p:stSnd>
-            <p:snd r:embed="rId2" name="applause.wav"/>
+            <p:snd r:embed="rId4" name="applause.wav"/>
           </p:stSnd>
         </p:sndAc>
       </p:transition>

</xml_diff>

<commit_message>
Added another test code slide
</commit_message>
<xml_diff>
--- a/Android Mobile Testing Presentation.pptx
+++ b/Android Mobile Testing Presentation.pptx
@@ -5,7 +5,7 @@
     <p:sldMasterId id="2147483696" r:id="rId1"/>
   </p:sldMasterIdLst>
   <p:notesMasterIdLst>
-    <p:notesMasterId r:id="rId11"/>
+    <p:notesMasterId r:id="rId12"/>
   </p:notesMasterIdLst>
   <p:sldIdLst>
     <p:sldId id="256" r:id="rId2"/>
@@ -16,7 +16,8 @@
     <p:sldId id="263" r:id="rId7"/>
     <p:sldId id="259" r:id="rId8"/>
     <p:sldId id="260" r:id="rId9"/>
-    <p:sldId id="258" r:id="rId10"/>
+    <p:sldId id="265" r:id="rId10"/>
+    <p:sldId id="258" r:id="rId11"/>
   </p:sldIdLst>
   <p:sldSz cx="9144000" cy="6858000" type="screen4x3"/>
   <p:notesSz cx="6858000" cy="9144000"/>
@@ -200,7 +201,7 @@
           <a:p>
             <a:fld id="{A8E5D2AC-58F4-431C-857D-3BFE4011063B}" type="datetimeFigureOut">
               <a:rPr lang="en-US" smtClean="0"/>
-              <a:t>5/6/2012</a:t>
+              <a:t>5/7/2012</a:t>
             </a:fld>
             <a:endParaRPr lang="en-US"/>
           </a:p>
@@ -1525,7 +1526,7 @@
           <a:p>
             <a:fld id="{6785061F-E17E-4936-BB72-CC5E73A6BFA1}" type="datetimeFigureOut">
               <a:rPr lang="en-US" smtClean="0"/>
-              <a:t>5/6/2012</a:t>
+              <a:t>5/7/2012</a:t>
             </a:fld>
             <a:endParaRPr lang="en-US"/>
           </a:p>
@@ -1702,7 +1703,7 @@
           <a:p>
             <a:fld id="{6785061F-E17E-4936-BB72-CC5E73A6BFA1}" type="datetimeFigureOut">
               <a:rPr lang="en-US" smtClean="0"/>
-              <a:t>5/6/2012</a:t>
+              <a:t>5/7/2012</a:t>
             </a:fld>
             <a:endParaRPr lang="en-US"/>
           </a:p>
@@ -1884,7 +1885,7 @@
           <a:p>
             <a:fld id="{6785061F-E17E-4936-BB72-CC5E73A6BFA1}" type="datetimeFigureOut">
               <a:rPr lang="en-US" smtClean="0"/>
-              <a:t>5/6/2012</a:t>
+              <a:t>5/7/2012</a:t>
             </a:fld>
             <a:endParaRPr lang="en-US"/>
           </a:p>
@@ -2093,7 +2094,7 @@
           <a:p>
             <a:fld id="{6785061F-E17E-4936-BB72-CC5E73A6BFA1}" type="datetimeFigureOut">
               <a:rPr lang="en-US" smtClean="0"/>
-              <a:t>5/6/2012</a:t>
+              <a:t>5/7/2012</a:t>
             </a:fld>
             <a:endParaRPr lang="en-US"/>
           </a:p>
@@ -2341,7 +2342,7 @@
           <a:p>
             <a:fld id="{6785061F-E17E-4936-BB72-CC5E73A6BFA1}" type="datetimeFigureOut">
               <a:rPr lang="en-US" smtClean="0"/>
-              <a:t>5/6/2012</a:t>
+              <a:t>5/7/2012</a:t>
             </a:fld>
             <a:endParaRPr lang="en-US"/>
           </a:p>
@@ -2640,7 +2641,7 @@
           <a:p>
             <a:fld id="{6785061F-E17E-4936-BB72-CC5E73A6BFA1}" type="datetimeFigureOut">
               <a:rPr lang="en-US" smtClean="0"/>
-              <a:t>5/6/2012</a:t>
+              <a:t>5/7/2012</a:t>
             </a:fld>
             <a:endParaRPr lang="en-US"/>
           </a:p>
@@ -3072,7 +3073,7 @@
           <a:p>
             <a:fld id="{6785061F-E17E-4936-BB72-CC5E73A6BFA1}" type="datetimeFigureOut">
               <a:rPr lang="en-US" smtClean="0"/>
-              <a:t>5/6/2012</a:t>
+              <a:t>5/7/2012</a:t>
             </a:fld>
             <a:endParaRPr lang="en-US"/>
           </a:p>
@@ -3192,7 +3193,7 @@
           <a:p>
             <a:fld id="{6785061F-E17E-4936-BB72-CC5E73A6BFA1}" type="datetimeFigureOut">
               <a:rPr lang="en-US" smtClean="0"/>
-              <a:t>5/6/2012</a:t>
+              <a:t>5/7/2012</a:t>
             </a:fld>
             <a:endParaRPr lang="en-US"/>
           </a:p>
@@ -3289,7 +3290,7 @@
           <a:p>
             <a:fld id="{6785061F-E17E-4936-BB72-CC5E73A6BFA1}" type="datetimeFigureOut">
               <a:rPr lang="en-US" smtClean="0"/>
-              <a:t>5/6/2012</a:t>
+              <a:t>5/7/2012</a:t>
             </a:fld>
             <a:endParaRPr lang="en-US"/>
           </a:p>
@@ -3572,7 +3573,7 @@
           <a:p>
             <a:fld id="{6785061F-E17E-4936-BB72-CC5E73A6BFA1}" type="datetimeFigureOut">
               <a:rPr lang="en-US" smtClean="0"/>
-              <a:t>5/6/2012</a:t>
+              <a:t>5/7/2012</a:t>
             </a:fld>
             <a:endParaRPr lang="en-US"/>
           </a:p>
@@ -3770,7 +3771,7 @@
           <a:p>
             <a:fld id="{6785061F-E17E-4936-BB72-CC5E73A6BFA1}" type="datetimeFigureOut">
               <a:rPr lang="en-US" smtClean="0"/>
-              <a:t>5/6/2012</a:t>
+              <a:t>5/7/2012</a:t>
             </a:fld>
             <a:endParaRPr lang="en-US"/>
           </a:p>
@@ -8328,7 +8329,7 @@
           <a:p>
             <a:fld id="{6785061F-E17E-4936-BB72-CC5E73A6BFA1}" type="datetimeFigureOut">
               <a:rPr lang="en-US" smtClean="0"/>
-              <a:t>5/6/2012</a:t>
+              <a:t>5/7/2012</a:t>
             </a:fld>
             <a:endParaRPr lang="en-US"/>
           </a:p>
@@ -9558,6 +9559,133 @@
 </p:sld>
 </file>
 
+<file path=ppt/slides/slide10.xml><?xml version="1.0" encoding="utf-8"?>
+<p:sld xmlns:a="http://schemas.openxmlformats.org/drawingml/2006/main" xmlns:r="http://schemas.openxmlformats.org/officeDocument/2006/relationships" xmlns:p="http://schemas.openxmlformats.org/presentationml/2006/main">
+  <p:cSld>
+    <p:spTree>
+      <p:nvGrpSpPr>
+        <p:cNvPr id="1" name=""/>
+        <p:cNvGrpSpPr/>
+        <p:nvPr/>
+      </p:nvGrpSpPr>
+      <p:grpSpPr>
+        <a:xfrm>
+          <a:off x="0" y="0"/>
+          <a:ext cx="0" cy="0"/>
+          <a:chOff x="0" y="0"/>
+          <a:chExt cx="0" cy="0"/>
+        </a:xfrm>
+      </p:grpSpPr>
+      <p:sp>
+        <p:nvSpPr>
+          <p:cNvPr id="2" name="Title 1"/>
+          <p:cNvSpPr>
+            <a:spLocks noGrp="1"/>
+          </p:cNvSpPr>
+          <p:nvPr>
+            <p:ph type="title"/>
+          </p:nvPr>
+        </p:nvSpPr>
+        <p:spPr/>
+        <p:txBody>
+          <a:bodyPr/>
+          <a:lstStyle/>
+          <a:p>
+            <a:r>
+              <a:rPr lang="en-US" sz="4000" dirty="0" smtClean="0">
+                <a:latin typeface="Ubuntu" pitchFamily="34" charset="0"/>
+              </a:rPr>
+              <a:t>Demo Stuff</a:t>
+            </a:r>
+            <a:endParaRPr lang="en-US" sz="4000" dirty="0">
+              <a:latin typeface="Ubuntu" pitchFamily="34" charset="0"/>
+            </a:endParaRPr>
+          </a:p>
+        </p:txBody>
+      </p:sp>
+      <p:pic>
+        <p:nvPicPr>
+          <p:cNvPr id="2052" name="Picture 4" descr="http://www.thewiredhomeschool.com/wp-content/uploads/2012/04/android_logo_waving.png"/>
+          <p:cNvPicPr>
+            <a:picLocks noChangeAspect="1" noChangeArrowheads="1"/>
+          </p:cNvPicPr>
+          <p:nvPr/>
+        </p:nvPicPr>
+        <p:blipFill>
+          <a:blip r:embed="rId3">
+            <a:extLst>
+              <a:ext uri="{28A0092B-C50C-407E-A947-70E740481C1C}">
+                <a14:useLocalDpi xmlns:a14="http://schemas.microsoft.com/office/drawing/2010/main" val="0"/>
+              </a:ext>
+            </a:extLst>
+          </a:blip>
+          <a:srcRect/>
+          <a:stretch>
+            <a:fillRect/>
+          </a:stretch>
+        </p:blipFill>
+        <p:spPr bwMode="auto">
+          <a:xfrm>
+            <a:off x="1828800" y="1752600"/>
+            <a:ext cx="4120814" cy="3914776"/>
+          </a:xfrm>
+          <a:prstGeom prst="rect">
+            <a:avLst/>
+          </a:prstGeom>
+          <a:noFill/>
+          <a:extLst>
+            <a:ext uri="{909E8E84-426E-40DD-AFC4-6F175D3DCCD1}">
+              <a14:hiddenFill xmlns:a14="http://schemas.microsoft.com/office/drawing/2010/main">
+                <a:solidFill>
+                  <a:srgbClr val="FFFFFF"/>
+                </a:solidFill>
+              </a14:hiddenFill>
+            </a:ext>
+          </a:extLst>
+        </p:spPr>
+      </p:pic>
+    </p:spTree>
+    <p:extLst>
+      <p:ext uri="{BB962C8B-B14F-4D97-AF65-F5344CB8AC3E}">
+        <p14:creationId xmlns:p14="http://schemas.microsoft.com/office/powerpoint/2010/main" val="3777420432"/>
+      </p:ext>
+    </p:extLst>
+  </p:cSld>
+  <p:clrMapOvr>
+    <a:masterClrMapping/>
+  </p:clrMapOvr>
+  <mc:AlternateContent xmlns:mc="http://schemas.openxmlformats.org/markup-compatibility/2006" xmlns:p14="http://schemas.microsoft.com/office/powerpoint/2010/main">
+    <mc:Choice Requires="p14">
+      <p:transition spd="slow" p14:dur="4400">
+        <p14:honeycomb/>
+        <p:sndAc>
+          <p:stSnd>
+            <p:snd r:embed="rId2" name="applause.wav"/>
+          </p:stSnd>
+        </p:sndAc>
+      </p:transition>
+    </mc:Choice>
+    <mc:Fallback xmlns="">
+      <p:transition spd="slow">
+        <p:fade/>
+        <p:sndAc>
+          <p:stSnd>
+            <p:snd r:embed="rId4" name="applause.wav"/>
+          </p:stSnd>
+        </p:sndAc>
+      </p:transition>
+    </mc:Fallback>
+  </mc:AlternateContent>
+  <p:timing>
+    <p:tnLst>
+      <p:par>
+        <p:cTn id="1" dur="indefinite" restart="never" nodeType="tmRoot"/>
+      </p:par>
+    </p:tnLst>
+  </p:timing>
+</p:sld>
+</file>
+
 <file path=ppt/slides/slide2.xml><?xml version="1.0" encoding="utf-8"?>
 <p:sld xmlns:a="http://schemas.openxmlformats.org/drawingml/2006/main" xmlns:r="http://schemas.openxmlformats.org/officeDocument/2006/relationships" xmlns:p="http://schemas.openxmlformats.org/presentationml/2006/main">
   <p:cSld>
@@ -10480,97 +10608,311 @@
           <a:lstStyle/>
           <a:p>
             <a:r>
-              <a:rPr lang="en-US" sz="4000" dirty="0" smtClean="0">
-                <a:latin typeface="Ubuntu" pitchFamily="34" charset="0"/>
-              </a:rPr>
-              <a:t>Demo Stuff</a:t>
-            </a:r>
-            <a:endParaRPr lang="en-US" sz="4000" dirty="0">
-              <a:latin typeface="Ubuntu" pitchFamily="34" charset="0"/>
-            </a:endParaRPr>
-          </a:p>
-        </p:txBody>
-      </p:sp>
-      <p:pic>
-        <p:nvPicPr>
-          <p:cNvPr id="2052" name="Picture 4" descr="http://www.thewiredhomeschool.com/wp-content/uploads/2012/04/android_logo_waving.png"/>
-          <p:cNvPicPr>
-            <a:picLocks noChangeAspect="1" noChangeArrowheads="1"/>
-          </p:cNvPicPr>
-          <p:nvPr/>
-        </p:nvPicPr>
-        <p:blipFill>
-          <a:blip r:embed="rId3">
-            <a:extLst>
-              <a:ext uri="{28A0092B-C50C-407E-A947-70E740481C1C}">
-                <a14:useLocalDpi xmlns:a14="http://schemas.microsoft.com/office/drawing/2010/main" val="0"/>
-              </a:ext>
-            </a:extLst>
-          </a:blip>
-          <a:srcRect/>
-          <a:stretch>
-            <a:fillRect/>
-          </a:stretch>
-        </p:blipFill>
-        <p:spPr bwMode="auto">
-          <a:xfrm>
-            <a:off x="1828800" y="1752600"/>
-            <a:ext cx="4120814" cy="3914776"/>
-          </a:xfrm>
-          <a:prstGeom prst="rect">
-            <a:avLst/>
-          </a:prstGeom>
-          <a:noFill/>
-          <a:extLst>
-            <a:ext uri="{909E8E84-426E-40DD-AFC4-6F175D3DCCD1}">
-              <a14:hiddenFill xmlns:a14="http://schemas.microsoft.com/office/drawing/2010/main">
-                <a:solidFill>
-                  <a:srgbClr val="FFFFFF"/>
-                </a:solidFill>
-              </a14:hiddenFill>
-            </a:ext>
-          </a:extLst>
-        </p:spPr>
-      </p:pic>
+              <a:rPr lang="en-US" dirty="0" smtClean="0"/>
+              <a:t>Example</a:t>
+            </a:r>
+            <a:endParaRPr lang="en-US" dirty="0"/>
+          </a:p>
+        </p:txBody>
+      </p:sp>
+      <p:sp>
+        <p:nvSpPr>
+          <p:cNvPr id="3" name="Content Placeholder 2"/>
+          <p:cNvSpPr>
+            <a:spLocks noGrp="1"/>
+          </p:cNvSpPr>
+          <p:nvPr>
+            <p:ph idx="1"/>
+          </p:nvPr>
+        </p:nvSpPr>
+        <p:spPr/>
+        <p:txBody>
+          <a:bodyPr>
+            <a:normAutofit fontScale="77500" lnSpcReduction="20000"/>
+          </a:bodyPr>
+          <a:lstStyle/>
+          <a:p>
+            <a:pPr marL="0" indent="0">
+              <a:buNone/>
+            </a:pPr>
+            <a:r>
+              <a:rPr lang="en-US" dirty="0"/>
+              <a:t>@Before</a:t>
+            </a:r>
+          </a:p>
+          <a:p>
+            <a:pPr marL="0" indent="0">
+              <a:buNone/>
+            </a:pPr>
+            <a:r>
+              <a:rPr lang="en-US" dirty="0"/>
+              <a:t>	public void </a:t>
+            </a:r>
+            <a:r>
+              <a:rPr lang="en-US" dirty="0" err="1"/>
+              <a:t>setUp</a:t>
+            </a:r>
+            <a:r>
+              <a:rPr lang="en-US" dirty="0"/>
+              <a:t>(){</a:t>
+            </a:r>
+          </a:p>
+          <a:p>
+            <a:pPr marL="0" indent="0">
+              <a:buNone/>
+            </a:pPr>
+            <a:r>
+              <a:rPr lang="en-US" dirty="0"/>
+              <a:t>		</a:t>
+            </a:r>
+            <a:r>
+              <a:rPr lang="en-US" dirty="0" err="1"/>
+              <a:t>pref</a:t>
+            </a:r>
+            <a:r>
+              <a:rPr lang="en-US" dirty="0"/>
+              <a:t> = </a:t>
+            </a:r>
+            <a:r>
+              <a:rPr lang="en-US" dirty="0" err="1"/>
+              <a:t>createMock</a:t>
+            </a:r>
+            <a:r>
+              <a:rPr lang="en-US" dirty="0"/>
+              <a:t>(</a:t>
+            </a:r>
+            <a:r>
+              <a:rPr lang="en-US" dirty="0" err="1"/>
+              <a:t>ISharedPreferences.class</a:t>
+            </a:r>
+            <a:r>
+              <a:rPr lang="en-US" dirty="0"/>
+              <a:t>);</a:t>
+            </a:r>
+          </a:p>
+          <a:p>
+            <a:pPr marL="0" indent="0">
+              <a:buNone/>
+            </a:pPr>
+            <a:r>
+              <a:rPr lang="en-US" dirty="0"/>
+              <a:t>		manager = new </a:t>
+            </a:r>
+            <a:r>
+              <a:rPr lang="en-US" dirty="0" err="1"/>
+              <a:t>PasswordManager</a:t>
+            </a:r>
+            <a:r>
+              <a:rPr lang="en-US" dirty="0"/>
+              <a:t>(</a:t>
+            </a:r>
+            <a:r>
+              <a:rPr lang="en-US" dirty="0" err="1"/>
+              <a:t>pref</a:t>
+            </a:r>
+            <a:r>
+              <a:rPr lang="en-US" dirty="0"/>
+              <a:t>);</a:t>
+            </a:r>
+          </a:p>
+          <a:p>
+            <a:pPr marL="0" indent="0">
+              <a:buNone/>
+            </a:pPr>
+            <a:r>
+              <a:rPr lang="en-US" dirty="0"/>
+              <a:t>	}</a:t>
+            </a:r>
+          </a:p>
+          <a:p>
+            <a:pPr marL="0" indent="0">
+              <a:buNone/>
+            </a:pPr>
+            <a:r>
+              <a:rPr lang="en-US" dirty="0"/>
+              <a:t>	</a:t>
+            </a:r>
+          </a:p>
+          <a:p>
+            <a:pPr marL="0" indent="0">
+              <a:buNone/>
+            </a:pPr>
+            <a:r>
+              <a:rPr lang="en-US" dirty="0"/>
+              <a:t>	@Test</a:t>
+            </a:r>
+          </a:p>
+          <a:p>
+            <a:pPr marL="0" indent="0">
+              <a:buNone/>
+            </a:pPr>
+            <a:r>
+              <a:rPr lang="en-US" dirty="0"/>
+              <a:t>	public void </a:t>
+            </a:r>
+            <a:r>
+              <a:rPr lang="en-US" dirty="0" err="1"/>
+              <a:t>testLoadBlankCrediantials</a:t>
+            </a:r>
+            <a:r>
+              <a:rPr lang="en-US" dirty="0"/>
+              <a:t>(){</a:t>
+            </a:r>
+          </a:p>
+          <a:p>
+            <a:pPr marL="0" indent="0">
+              <a:buNone/>
+            </a:pPr>
+            <a:r>
+              <a:rPr lang="en-US" dirty="0"/>
+              <a:t>		expect(</a:t>
+            </a:r>
+            <a:r>
+              <a:rPr lang="en-US" dirty="0" err="1"/>
+              <a:t>pref.getString</a:t>
+            </a:r>
+            <a:r>
+              <a:rPr lang="en-US" dirty="0"/>
+              <a:t>(</a:t>
+            </a:r>
+            <a:r>
+              <a:rPr lang="en-US" dirty="0" err="1"/>
+              <a:t>PasswordManager.USERNAME</a:t>
+            </a:r>
+            <a:r>
+              <a:rPr lang="en-US" dirty="0"/>
+              <a:t>, "")).</a:t>
+            </a:r>
+            <a:r>
+              <a:rPr lang="en-US" dirty="0" err="1"/>
+              <a:t>andReturn</a:t>
+            </a:r>
+            <a:r>
+              <a:rPr lang="en-US" dirty="0"/>
+              <a:t>("");</a:t>
+            </a:r>
+          </a:p>
+          <a:p>
+            <a:pPr marL="0" indent="0">
+              <a:buNone/>
+            </a:pPr>
+            <a:r>
+              <a:rPr lang="en-US" dirty="0"/>
+              <a:t>		expect(</a:t>
+            </a:r>
+            <a:r>
+              <a:rPr lang="en-US" dirty="0" err="1"/>
+              <a:t>pref.getString</a:t>
+            </a:r>
+            <a:r>
+              <a:rPr lang="en-US" dirty="0"/>
+              <a:t>(</a:t>
+            </a:r>
+            <a:r>
+              <a:rPr lang="en-US" dirty="0" err="1"/>
+              <a:t>PasswordManager.PASSWORD</a:t>
+            </a:r>
+            <a:r>
+              <a:rPr lang="en-US" dirty="0"/>
+              <a:t>, "")).</a:t>
+            </a:r>
+            <a:r>
+              <a:rPr lang="en-US" dirty="0" err="1"/>
+              <a:t>andReturn</a:t>
+            </a:r>
+            <a:r>
+              <a:rPr lang="en-US" dirty="0"/>
+              <a:t>("");</a:t>
+            </a:r>
+          </a:p>
+          <a:p>
+            <a:pPr marL="0" indent="0">
+              <a:buNone/>
+            </a:pPr>
+            <a:r>
+              <a:rPr lang="en-US" dirty="0"/>
+              <a:t>		replay(</a:t>
+            </a:r>
+            <a:r>
+              <a:rPr lang="en-US" dirty="0" err="1"/>
+              <a:t>pref</a:t>
+            </a:r>
+            <a:r>
+              <a:rPr lang="en-US" dirty="0"/>
+              <a:t>);</a:t>
+            </a:r>
+          </a:p>
+          <a:p>
+            <a:pPr marL="0" indent="0">
+              <a:buNone/>
+            </a:pPr>
+            <a:r>
+              <a:rPr lang="en-US" dirty="0"/>
+              <a:t>		</a:t>
+            </a:r>
+            <a:r>
+              <a:rPr lang="en-US" dirty="0" err="1"/>
+              <a:t>assertEquals</a:t>
+            </a:r>
+            <a:r>
+              <a:rPr lang="en-US" dirty="0"/>
+              <a:t>("", </a:t>
+            </a:r>
+            <a:r>
+              <a:rPr lang="en-US" dirty="0" err="1"/>
+              <a:t>manager.getUsername</a:t>
+            </a:r>
+            <a:r>
+              <a:rPr lang="en-US" dirty="0"/>
+              <a:t>());</a:t>
+            </a:r>
+          </a:p>
+          <a:p>
+            <a:pPr marL="0" indent="0">
+              <a:buNone/>
+            </a:pPr>
+            <a:r>
+              <a:rPr lang="en-US" dirty="0"/>
+              <a:t>		</a:t>
+            </a:r>
+            <a:r>
+              <a:rPr lang="en-US" dirty="0" err="1"/>
+              <a:t>assertEquals</a:t>
+            </a:r>
+            <a:r>
+              <a:rPr lang="en-US" dirty="0"/>
+              <a:t>("", </a:t>
+            </a:r>
+            <a:r>
+              <a:rPr lang="en-US" dirty="0" err="1"/>
+              <a:t>manager.getPassword</a:t>
+            </a:r>
+            <a:r>
+              <a:rPr lang="en-US" dirty="0"/>
+              <a:t>());</a:t>
+            </a:r>
+          </a:p>
+          <a:p>
+            <a:pPr marL="0" indent="0">
+              <a:buNone/>
+            </a:pPr>
+            <a:r>
+              <a:rPr lang="en-US" dirty="0"/>
+              <a:t>	}</a:t>
+            </a:r>
+          </a:p>
+        </p:txBody>
+      </p:sp>
     </p:spTree>
     <p:extLst>
       <p:ext uri="{BB962C8B-B14F-4D97-AF65-F5344CB8AC3E}">
-        <p14:creationId xmlns:p14="http://schemas.microsoft.com/office/powerpoint/2010/main" val="3777420432"/>
+        <p14:creationId xmlns:p14="http://schemas.microsoft.com/office/powerpoint/2010/main" val="4162808566"/>
       </p:ext>
     </p:extLst>
   </p:cSld>
   <p:clrMapOvr>
     <a:masterClrMapping/>
   </p:clrMapOvr>
-  <mc:AlternateContent xmlns:mc="http://schemas.openxmlformats.org/markup-compatibility/2006" xmlns:p14="http://schemas.microsoft.com/office/powerpoint/2010/main">
-    <mc:Choice Requires="p14">
-      <p:transition spd="slow" p14:dur="4400">
-        <p14:honeycomb/>
-        <p:sndAc>
-          <p:stSnd>
-            <p:snd r:embed="rId2" name="applause.wav"/>
-          </p:stSnd>
-        </p:sndAc>
-      </p:transition>
-    </mc:Choice>
-    <mc:Fallback xmlns="">
-      <p:transition spd="slow">
-        <p:fade/>
-        <p:sndAc>
-          <p:stSnd>
-            <p:snd r:embed="rId4" name="applause.wav"/>
-          </p:stSnd>
-        </p:sndAc>
-      </p:transition>
-    </mc:Fallback>
-  </mc:AlternateContent>
-  <p:timing>
-    <p:tnLst>
-      <p:par>
-        <p:cTn id="1" dur="indefinite" restart="never" nodeType="tmRoot"/>
-      </p:par>
-    </p:tnLst>
-  </p:timing>
 </p:sld>
 </file>
 

</xml_diff>